<commit_message>
artigo e novo banner
</commit_message>
<xml_diff>
--- a/TCC - POLARIS BANNER (1).pptx
+++ b/TCC - POLARIS BANNER (1).pptx
@@ -254,7 +254,7 @@
           <a:p>
             <a:fld id="{26A793FE-9174-4BCA-8FC1-2C151984D1DA}" type="datetimeFigureOut">
               <a:rPr lang="pt-BR" smtClean="0"/>
-              <a:t>31/10/2025</a:t>
+              <a:t>14/11/2025</a:t>
             </a:fld>
             <a:endParaRPr lang="pt-BR"/>
           </a:p>
@@ -424,7 +424,7 @@
           <a:p>
             <a:fld id="{26A793FE-9174-4BCA-8FC1-2C151984D1DA}" type="datetimeFigureOut">
               <a:rPr lang="pt-BR" smtClean="0"/>
-              <a:t>31/10/2025</a:t>
+              <a:t>14/11/2025</a:t>
             </a:fld>
             <a:endParaRPr lang="pt-BR"/>
           </a:p>
@@ -604,7 +604,7 @@
           <a:p>
             <a:fld id="{26A793FE-9174-4BCA-8FC1-2C151984D1DA}" type="datetimeFigureOut">
               <a:rPr lang="pt-BR" smtClean="0"/>
-              <a:t>31/10/2025</a:t>
+              <a:t>14/11/2025</a:t>
             </a:fld>
             <a:endParaRPr lang="pt-BR"/>
           </a:p>
@@ -774,7 +774,7 @@
           <a:p>
             <a:fld id="{26A793FE-9174-4BCA-8FC1-2C151984D1DA}" type="datetimeFigureOut">
               <a:rPr lang="pt-BR" smtClean="0"/>
-              <a:t>31/10/2025</a:t>
+              <a:t>14/11/2025</a:t>
             </a:fld>
             <a:endParaRPr lang="pt-BR"/>
           </a:p>
@@ -1018,7 +1018,7 @@
           <a:p>
             <a:fld id="{26A793FE-9174-4BCA-8FC1-2C151984D1DA}" type="datetimeFigureOut">
               <a:rPr lang="pt-BR" smtClean="0"/>
-              <a:t>31/10/2025</a:t>
+              <a:t>14/11/2025</a:t>
             </a:fld>
             <a:endParaRPr lang="pt-BR"/>
           </a:p>
@@ -1250,7 +1250,7 @@
           <a:p>
             <a:fld id="{26A793FE-9174-4BCA-8FC1-2C151984D1DA}" type="datetimeFigureOut">
               <a:rPr lang="pt-BR" smtClean="0"/>
-              <a:t>31/10/2025</a:t>
+              <a:t>14/11/2025</a:t>
             </a:fld>
             <a:endParaRPr lang="pt-BR"/>
           </a:p>
@@ -1617,7 +1617,7 @@
           <a:p>
             <a:fld id="{26A793FE-9174-4BCA-8FC1-2C151984D1DA}" type="datetimeFigureOut">
               <a:rPr lang="pt-BR" smtClean="0"/>
-              <a:t>31/10/2025</a:t>
+              <a:t>14/11/2025</a:t>
             </a:fld>
             <a:endParaRPr lang="pt-BR"/>
           </a:p>
@@ -1735,7 +1735,7 @@
           <a:p>
             <a:fld id="{26A793FE-9174-4BCA-8FC1-2C151984D1DA}" type="datetimeFigureOut">
               <a:rPr lang="pt-BR" smtClean="0"/>
-              <a:t>31/10/2025</a:t>
+              <a:t>14/11/2025</a:t>
             </a:fld>
             <a:endParaRPr lang="pt-BR"/>
           </a:p>
@@ -1830,7 +1830,7 @@
           <a:p>
             <a:fld id="{26A793FE-9174-4BCA-8FC1-2C151984D1DA}" type="datetimeFigureOut">
               <a:rPr lang="pt-BR" smtClean="0"/>
-              <a:t>31/10/2025</a:t>
+              <a:t>14/11/2025</a:t>
             </a:fld>
             <a:endParaRPr lang="pt-BR"/>
           </a:p>
@@ -2107,7 +2107,7 @@
           <a:p>
             <a:fld id="{26A793FE-9174-4BCA-8FC1-2C151984D1DA}" type="datetimeFigureOut">
               <a:rPr lang="pt-BR" smtClean="0"/>
-              <a:t>31/10/2025</a:t>
+              <a:t>14/11/2025</a:t>
             </a:fld>
             <a:endParaRPr lang="pt-BR"/>
           </a:p>
@@ -2364,7 +2364,7 @@
           <a:p>
             <a:fld id="{26A793FE-9174-4BCA-8FC1-2C151984D1DA}" type="datetimeFigureOut">
               <a:rPr lang="pt-BR" smtClean="0"/>
-              <a:t>31/10/2025</a:t>
+              <a:t>14/11/2025</a:t>
             </a:fld>
             <a:endParaRPr lang="pt-BR"/>
           </a:p>
@@ -2577,7 +2577,7 @@
           <a:p>
             <a:fld id="{26A793FE-9174-4BCA-8FC1-2C151984D1DA}" type="datetimeFigureOut">
               <a:rPr lang="pt-BR" smtClean="0"/>
-              <a:t>31/10/2025</a:t>
+              <a:t>14/11/2025</a:t>
             </a:fld>
             <a:endParaRPr lang="pt-BR"/>
           </a:p>
@@ -3391,7 +3391,7 @@
         </p:nvSpPr>
         <p:spPr>
           <a:xfrm>
-            <a:off x="495086" y="20216931"/>
+            <a:off x="593067" y="23272550"/>
             <a:ext cx="15480000" cy="900000"/>
           </a:xfrm>
           <a:prstGeom prst="rect">
@@ -3483,7 +3483,7 @@
         </p:nvSpPr>
         <p:spPr>
           <a:xfrm>
-            <a:off x="16373057" y="28950818"/>
+            <a:off x="16373057" y="27997281"/>
             <a:ext cx="15480000" cy="918951"/>
           </a:xfrm>
           <a:prstGeom prst="rect">
@@ -3529,7 +3529,7 @@
         </p:nvSpPr>
         <p:spPr>
           <a:xfrm>
-            <a:off x="16373057" y="35823883"/>
+            <a:off x="16373057" y="35192874"/>
             <a:ext cx="15480000" cy="918951"/>
           </a:xfrm>
           <a:prstGeom prst="rect">
@@ -3573,8 +3573,8 @@
         </p:nvSpPr>
         <p:spPr>
           <a:xfrm>
-            <a:off x="922290" y="11078652"/>
-            <a:ext cx="14385327" cy="5478423"/>
+            <a:off x="476899" y="11078652"/>
+            <a:ext cx="15429201" cy="4939814"/>
           </a:xfrm>
           <a:prstGeom prst="rect">
             <a:avLst/>
@@ -3601,31 +3601,38 @@
           <a:p>
             <a:pPr algn="just"/>
             <a:r>
-              <a:rPr lang="pt-BR" sz="3500" dirty="0">
-                <a:latin typeface="Arial" panose="020B0604020202020204" pitchFamily="34" charset="0"/>
-                <a:cs typeface="Arial" panose="020B0604020202020204" pitchFamily="34" charset="0"/>
-              </a:rPr>
-              <a:t>O presente estudo apresenta o aplicativo Polaris, criado para auxiliar pessoas neurodivergentes, como aquelas com TAB, TDAH e TEA, no monitoramento do bem-estar. O app organiza dados sobre sono, tempo de tela e atividade física, ajudando o usuário a identificar padrões e melhorar sua rotina e saúde mental. </a:t>
+              <a:rPr lang="pt-BR" sz="3500" dirty="0"/>
+              <a:t>O presente estudo apresenta o aplicativo </a:t>
+            </a:r>
+            <a:r>
+              <a:rPr lang="pt-BR" sz="3500" i="1" dirty="0"/>
+              <a:t>Polaris</a:t>
+            </a:r>
+            <a:r>
+              <a:rPr lang="pt-BR" sz="3500" dirty="0"/>
+              <a:t>, criado para auxiliar pessoas neurodivergentes, como aquelas com TAB, TDAH e TEA, no monitoramento do bem-estar. O aplicativo organiza dados sobre sono, tempo de tela e atividade física, ajudando o usuário a identificar padrões e a melhorar sua rotina e saúde mental.</a:t>
             </a:r>
           </a:p>
           <a:p>
             <a:pPr algn="just"/>
             <a:r>
-              <a:rPr lang="pt-BR" sz="3500" dirty="0">
-                <a:latin typeface="Arial" panose="020B0604020202020204" pitchFamily="34" charset="0"/>
-                <a:cs typeface="Arial" panose="020B0604020202020204" pitchFamily="34" charset="0"/>
-              </a:rPr>
-              <a:t>Com interface acessível e foco na privacidade, o Polaris também permite gerar relatórios personalizados para profissionais de saúde. </a:t>
+              <a:rPr lang="pt-BR" sz="3500" dirty="0"/>
+              <a:t>Com uma interface acessível e foco na privacidade, o </a:t>
+            </a:r>
+            <a:r>
+              <a:rPr lang="pt-BR" sz="3500" i="1" dirty="0"/>
+              <a:t>Polaris</a:t>
+            </a:r>
+            <a:r>
+              <a:rPr lang="pt-BR" sz="3500" dirty="0"/>
+              <a:t> também permite a geração de relatórios personalizados para profissionais de saúde.</a:t>
             </a:r>
           </a:p>
           <a:p>
             <a:pPr algn="just"/>
             <a:r>
-              <a:rPr lang="pt-BR" sz="3500" dirty="0">
-                <a:latin typeface="Arial" panose="020B0604020202020204" pitchFamily="34" charset="0"/>
-                <a:cs typeface="Arial" panose="020B0604020202020204" pitchFamily="34" charset="0"/>
-              </a:rPr>
-              <a:t>O projeto utiliza metodologias centradas no usuário, incluindo análise de ferramentas semelhantes, revisão bibliográfica e testes com usuários para aprimoramento contínuo.  </a:t>
+              <a:rPr lang="pt-BR" sz="3500" dirty="0"/>
+              <a:t>O projeto utiliza metodologias centradas no usuário, incluindo análise de ferramentas semelhantes, revisão bibliográfica e testes com usuários, visando ao aprimoramento contínuo da solução.</a:t>
             </a:r>
           </a:p>
         </p:txBody>
@@ -3646,7 +3653,7 @@
         </p:nvSpPr>
         <p:spPr>
           <a:xfrm>
-            <a:off x="349381" y="30152088"/>
+            <a:off x="476899" y="32009045"/>
             <a:ext cx="15480000" cy="900000"/>
           </a:xfrm>
           <a:prstGeom prst="rect">
@@ -3690,8 +3697,8 @@
         </p:nvSpPr>
         <p:spPr>
           <a:xfrm>
-            <a:off x="16569909" y="18340989"/>
-            <a:ext cx="15257575" cy="4524315"/>
+            <a:off x="16646628" y="17840282"/>
+            <a:ext cx="15257575" cy="4401205"/>
           </a:xfrm>
           <a:prstGeom prst="rect">
             <a:avLst/>
@@ -3718,20 +3725,24 @@
           <a:p>
             <a:pPr algn="just"/>
             <a:r>
-              <a:rPr lang="pt-BR" sz="3600" dirty="0"/>
-              <a:t>O interesse dos participantes pelo Polaris mostra que há um campo pouco explorado na tecnologia voltada ao monitoramento emocional e organização pessoal, o design do aplicativo prioriza conforto sensorial, acessibilidade cognitiva e proteção de dados, oferecendo notificações personalizadas e registro de humor para incentivar a autogestão e a independência.</a:t>
+              <a:rPr lang="pt-BR" sz="3500" dirty="0"/>
+              <a:t>O interesse dos participantes pelo </a:t>
+            </a:r>
+            <a:r>
+              <a:rPr lang="pt-BR" sz="3500" i="1" dirty="0"/>
+              <a:t>Polaris</a:t>
+            </a:r>
+            <a:r>
+              <a:rPr lang="pt-BR" sz="3500" dirty="0"/>
+              <a:t> mostra que há um campo pouco explorado na tecnologia voltada ao monitoramento emocional e à organização pessoal. O design do aplicativo prioriza o conforto sensorial, a acessibilidade cognitiva e a proteção de dados, oferecendo notificações personalizadas e registro de humor para incentivar a autogestão e a independência.</a:t>
             </a:r>
           </a:p>
           <a:p>
             <a:pPr algn="just"/>
             <a:r>
-              <a:rPr lang="pt-BR" sz="3600" dirty="0"/>
-              <a:t>A maioria dos usuários afirmou que usaria ou recomendaria o aplicativo, confirmando sua aceitação e potencial como ferramenta inclusiva e inovadora para o bem-estar emocional.</a:t>
-            </a:r>
-            <a:endParaRPr lang="pt-BR" sz="3500" dirty="0">
-              <a:latin typeface="Arial" panose="020B0604020202020204" pitchFamily="34" charset="0"/>
-              <a:cs typeface="Arial" panose="020B0604020202020204" pitchFamily="34" charset="0"/>
-            </a:endParaRPr>
+              <a:rPr lang="pt-BR" sz="3500" dirty="0"/>
+              <a:t>A maioria dos usuários afirmou que usaria ou recomendaria o aplicativo, confirmando sua aceitação e seu potencial como ferramenta inclusiva e inovadora para o bem-estar emocional.</a:t>
+            </a:r>
           </a:p>
         </p:txBody>
       </p:sp>
@@ -3749,8 +3760,8 @@
         </p:nvSpPr>
         <p:spPr>
           <a:xfrm>
-            <a:off x="477246" y="21499168"/>
-            <a:ext cx="15428854" cy="9248686"/>
+            <a:off x="521947" y="28623052"/>
+            <a:ext cx="15604028" cy="3323987"/>
           </a:xfrm>
           <a:prstGeom prst="rect">
             <a:avLst/>
@@ -3775,31 +3786,15 @@
           </a:bodyPr>
           <a:lstStyle/>
           <a:p>
-            <a:pPr algn="just"/>
-            <a:r>
-              <a:rPr lang="pt-BR" sz="3500" dirty="0">
-                <a:latin typeface="Arial" panose="020B0604020202020204" pitchFamily="34" charset="0"/>
-                <a:cs typeface="Arial" panose="020B0604020202020204" pitchFamily="34" charset="0"/>
-              </a:rPr>
-              <a:t>O objetivo do Projeto Polaris é auxiliar no cuidado e acompanhamento da saúde mental por meio de um aplicativo simples, intuitivo e acessível, a  proposta é oferecer uma ferramenta que ajude o usuário a registrar e monitorar o próprio humor, sintomas e hábitos diários, possibilitando a identificação de padrões e a compreensão mais profunda sobre seu bem-estar emocional. Além de incentivar o autoconhecimento, o aplicativo busca fortalecer o vínculo entre paciente e profissional de saúde, permitindo o compartilhamento de dados que podem contribuir para um acompanhamento mais preciso e personalizado.</a:t>
-            </a:r>
-          </a:p>
-          <a:p>
-            <a:pPr algn="just"/>
-            <a:r>
-              <a:rPr lang="pt-BR" sz="3500" dirty="0">
-                <a:latin typeface="Arial" panose="020B0604020202020204" pitchFamily="34" charset="0"/>
-                <a:cs typeface="Arial" panose="020B0604020202020204" pitchFamily="34" charset="0"/>
-              </a:rPr>
+            <a:pPr algn="just">
+              <a:spcAft>
+                <a:spcPts val="600"/>
+              </a:spcAft>
+            </a:pPr>
+            <a:r>
+              <a:rPr lang="pt-BR" sz="3500" dirty="0"/>
               <a:t>O Polaris também pretende preencher uma lacuna existente nos serviços de apoio psicológico, especialmente para pessoas que têm dificuldade de acesso a atendimentos especializados. Ao integrar tecnologia e saúde mental, o projeto visa promover uma forma prática e constante de cuidado, estimulando a autonomia emocional, a prevenção de crises e o desenvolvimento de hábitos saudáveis que contribuam para a melhoria da qualidade de vida.</a:t>
             </a:r>
-          </a:p>
-          <a:p>
-            <a:pPr algn="just"/>
-            <a:endParaRPr lang="en-US" sz="3500" dirty="0">
-              <a:latin typeface="Arial" panose="020B0604020202020204" pitchFamily="34" charset="0"/>
-              <a:cs typeface="Arial" panose="020B0604020202020204" pitchFamily="34" charset="0"/>
-            </a:endParaRPr>
           </a:p>
         </p:txBody>
       </p:sp>
@@ -3817,8 +3812,8 @@
         </p:nvSpPr>
         <p:spPr>
           <a:xfrm>
-            <a:off x="546231" y="33326546"/>
-            <a:ext cx="15428854" cy="5478423"/>
+            <a:off x="644213" y="35418611"/>
+            <a:ext cx="15428854" cy="4939814"/>
           </a:xfrm>
           <a:prstGeom prst="rect">
             <a:avLst/>
@@ -3845,16 +3840,25 @@
           <a:p>
             <a:pPr algn="just"/>
             <a:r>
-              <a:rPr lang="pt-BR" sz="3500" dirty="0">
-                <a:latin typeface="Arial" panose="020B0604020202020204" pitchFamily="34" charset="0"/>
-                <a:cs typeface="Arial" panose="020B0604020202020204" pitchFamily="34" charset="0"/>
-              </a:rPr>
-              <a:t>Foram analisados estudos e pesquisas sobre o uso de aplicativos por pessoas neurodivergentes e realizadas entrevistas para identificar barreiras de acessibilidade e usabilidade no desenvolvimento do Polaris. Em seguida, criou-se um protótipo com base em princípios de design inclusivo e tecnologias acessíveis, o aplicativo passou por testes internos para avaliar eficiência e adequação às necessidades dos usuários. Por fim, os resultados mostraram o potencial do Polaris em auxiliar pessoas neurodivergentes, evidenciando pontos fortes, limitações e possibilidades de melhoria, a metodologia uniu pesquisa teórica e prática, resultando em uma solução tecnológica voltada à inclusão.</a:t>
-            </a:r>
-            <a:endParaRPr lang="en-US" sz="3500" dirty="0">
-              <a:latin typeface="Arial" panose="020B0604020202020204" pitchFamily="34" charset="0"/>
-              <a:cs typeface="Arial" panose="020B0604020202020204" pitchFamily="34" charset="0"/>
-            </a:endParaRPr>
+              <a:rPr lang="pt-BR" sz="3500" dirty="0"/>
+              <a:t>Foram analisados estudos e pesquisas sobre o uso de aplicativos por pessoas neurodivergentes, além de realizadas entrevistas para identificar barreiras de acessibilidade e usabilidade no desenvolvimento do </a:t>
+            </a:r>
+            <a:r>
+              <a:rPr lang="pt-BR" sz="3500" i="1" dirty="0"/>
+              <a:t>Polaris</a:t>
+            </a:r>
+            <a:r>
+              <a:rPr lang="pt-BR" sz="3500" dirty="0"/>
+              <a:t>. Em seguida, foi criado um protótipo baseado em princípios de design inclusivo e em tecnologias acessíveis. O aplicativo passou por testes internos para avaliar sua eficiência e adequação às necessidades dos usuários. Por fim, os resultados mostraram o potencial do </a:t>
+            </a:r>
+            <a:r>
+              <a:rPr lang="pt-BR" sz="3500" i="1" dirty="0"/>
+              <a:t>Polaris</a:t>
+            </a:r>
+            <a:r>
+              <a:rPr lang="pt-BR" sz="3500" dirty="0"/>
+              <a:t> em auxiliar pessoas neurodivergentes, evidenciando seus pontos fortes, limitações e possibilidades de melhoria. A metodologia adotada uniu pesquisa teórica e prática, resultando em uma solução tecnológica voltada à inclusão.</a:t>
+            </a:r>
           </a:p>
         </p:txBody>
       </p:sp>
@@ -3872,8 +3876,8 @@
         </p:nvSpPr>
         <p:spPr>
           <a:xfrm>
-            <a:off x="16374818" y="29936858"/>
-            <a:ext cx="15428854" cy="6186309"/>
+            <a:off x="16273314" y="29000529"/>
+            <a:ext cx="15428854" cy="6017032"/>
           </a:xfrm>
           <a:prstGeom prst="rect">
             <a:avLst/>
@@ -3900,16 +3904,32 @@
           <a:p>
             <a:pPr algn="just"/>
             <a:r>
-              <a:rPr lang="pt-BR" sz="3500" dirty="0">
-                <a:latin typeface="Arial" panose="020B0604020202020204" pitchFamily="34" charset="0"/>
-                <a:cs typeface="Arial" panose="020B0604020202020204" pitchFamily="34" charset="0"/>
-              </a:rPr>
-              <a:t>O estudo teve como objetivo apresentar e analisar o Polaris, um aplicativo para pessoas neurodivergentes focado em autonomia, bem-estar e autoconhecimento. A pesquisa com usuários, familiares e profissionais da saúde e educação revelou alto interesse pelo projeto, destacando seu monitoramento sensível e humanizado, que respeita limites e preferências individuais, além de favorecer a comunicação com terapeutas sem comprometer a privacidade. Entre os desafios estão a proteção de dados e a necessidade de testes contínuos para aperfeiçoar a experiência de diferentes perfis de usuários. O Polaris se consolida como uma iniciativa que combina tecnologia, empatia e inclusão, promovendo acompanhamento pessoal, autogestão e bem-estar.</a:t>
-            </a:r>
-            <a:endParaRPr lang="en-US" sz="3500" dirty="0">
-              <a:latin typeface="Arial" panose="020B0604020202020204" pitchFamily="34" charset="0"/>
-              <a:cs typeface="Arial" panose="020B0604020202020204" pitchFamily="34" charset="0"/>
-            </a:endParaRPr>
+              <a:rPr lang="pt-BR" sz="3500" dirty="0"/>
+              <a:t>O estudo teve como objetivo apresentar e analisar o </a:t>
+            </a:r>
+            <a:r>
+              <a:rPr lang="pt-BR" sz="3500" i="1" dirty="0"/>
+              <a:t>Polaris</a:t>
+            </a:r>
+            <a:r>
+              <a:rPr lang="pt-BR" sz="3500" dirty="0"/>
+              <a:t>, um aplicativo voltado para pessoas neurodivergentes e focado em autonomia, bem-estar e autoconhecimento. A pesquisa realizada com usuários, familiares e profissionais das áreas da saúde e da educação revelou um alto interesse pelo projeto, destacando seu monitoramento sensível e humanizado, que respeita limites e preferências individuais, além de favorecer a comunicação com terapeutas sem comprometer a privacidade.</a:t>
+            </a:r>
+          </a:p>
+          <a:p>
+            <a:pPr algn="just"/>
+            <a:r>
+              <a:rPr lang="pt-BR" sz="3500" dirty="0"/>
+              <a:t>Entre os desafios identificados estão a proteção de dados e a necessidade de testes contínuos para aperfeiçoar a experiência de diferentes perfis de usuários. O </a:t>
+            </a:r>
+            <a:r>
+              <a:rPr lang="pt-BR" sz="3500" i="1" dirty="0"/>
+              <a:t>Polaris</a:t>
+            </a:r>
+            <a:r>
+              <a:rPr lang="pt-BR" sz="3500" dirty="0"/>
+              <a:t> se consolida como uma iniciativa que combina tecnologia, empatia e inclusão, promovendo acompanhamento pessoal, autogestão e bem-estar.</a:t>
+            </a:r>
           </a:p>
         </p:txBody>
       </p:sp>
@@ -3927,7 +3947,7 @@
         </p:nvSpPr>
         <p:spPr>
           <a:xfrm>
-            <a:off x="16374818" y="36895677"/>
+            <a:off x="16360396" y="36341889"/>
             <a:ext cx="15428854" cy="4401205"/>
           </a:xfrm>
           <a:prstGeom prst="rect">
@@ -3955,367 +3975,46 @@
           <a:p>
             <a:pPr algn="just"/>
             <a:r>
-              <a:rPr lang="en-US" sz="3500" dirty="0">
-                <a:latin typeface="Arial" panose="020B0604020202020204" pitchFamily="34" charset="0"/>
-                <a:cs typeface="Arial" panose="020B0604020202020204" pitchFamily="34" charset="0"/>
-              </a:rPr>
-              <a:t>BORGES, M. F.; SILVA, L. T. </a:t>
-            </a:r>
-            <a:r>
-              <a:rPr lang="en-US" sz="3500" dirty="0" err="1">
-                <a:latin typeface="Arial" panose="020B0604020202020204" pitchFamily="34" charset="0"/>
-                <a:cs typeface="Arial" panose="020B0604020202020204" pitchFamily="34" charset="0"/>
-              </a:rPr>
-              <a:t>Tecnologias</a:t>
-            </a:r>
-            <a:r>
-              <a:rPr lang="en-US" sz="3500" dirty="0">
-                <a:latin typeface="Arial" panose="020B0604020202020204" pitchFamily="34" charset="0"/>
-                <a:cs typeface="Arial" panose="020B0604020202020204" pitchFamily="34" charset="0"/>
-              </a:rPr>
-              <a:t> assistivas e </a:t>
-            </a:r>
-            <a:r>
-              <a:rPr lang="en-US" sz="3500" dirty="0" err="1">
-                <a:latin typeface="Arial" panose="020B0604020202020204" pitchFamily="34" charset="0"/>
-                <a:cs typeface="Arial" panose="020B0604020202020204" pitchFamily="34" charset="0"/>
-              </a:rPr>
-              <a:t>inclusão</a:t>
-            </a:r>
-            <a:r>
-              <a:rPr lang="en-US" sz="3500" dirty="0">
-                <a:latin typeface="Arial" panose="020B0604020202020204" pitchFamily="34" charset="0"/>
-                <a:cs typeface="Arial" panose="020B0604020202020204" pitchFamily="34" charset="0"/>
-              </a:rPr>
-              <a:t> de </a:t>
-            </a:r>
-            <a:r>
-              <a:rPr lang="en-US" sz="3500" dirty="0" err="1">
-                <a:latin typeface="Arial" panose="020B0604020202020204" pitchFamily="34" charset="0"/>
-                <a:cs typeface="Arial" panose="020B0604020202020204" pitchFamily="34" charset="0"/>
-              </a:rPr>
-              <a:t>pessoas</a:t>
-            </a:r>
-            <a:r>
-              <a:rPr lang="en-US" sz="3500" dirty="0">
-                <a:latin typeface="Arial" panose="020B0604020202020204" pitchFamily="34" charset="0"/>
-                <a:cs typeface="Arial" panose="020B0604020202020204" pitchFamily="34" charset="0"/>
-              </a:rPr>
-              <a:t> com </a:t>
-            </a:r>
-            <a:r>
-              <a:rPr lang="en-US" sz="3500" dirty="0" err="1">
-                <a:latin typeface="Arial" panose="020B0604020202020204" pitchFamily="34" charset="0"/>
-                <a:cs typeface="Arial" panose="020B0604020202020204" pitchFamily="34" charset="0"/>
-              </a:rPr>
-              <a:t>necessidades</a:t>
-            </a:r>
-            <a:r>
-              <a:rPr lang="en-US" sz="3500" dirty="0">
-                <a:latin typeface="Arial" panose="020B0604020202020204" pitchFamily="34" charset="0"/>
-                <a:cs typeface="Arial" panose="020B0604020202020204" pitchFamily="34" charset="0"/>
-              </a:rPr>
-              <a:t> </a:t>
-            </a:r>
-            <a:r>
-              <a:rPr lang="en-US" sz="3500" dirty="0" err="1">
-                <a:latin typeface="Arial" panose="020B0604020202020204" pitchFamily="34" charset="0"/>
-                <a:cs typeface="Arial" panose="020B0604020202020204" pitchFamily="34" charset="0"/>
-              </a:rPr>
-              <a:t>cognitivas</a:t>
-            </a:r>
-            <a:r>
-              <a:rPr lang="en-US" sz="3500" dirty="0">
-                <a:latin typeface="Arial" panose="020B0604020202020204" pitchFamily="34" charset="0"/>
-                <a:cs typeface="Arial" panose="020B0604020202020204" pitchFamily="34" charset="0"/>
-              </a:rPr>
-              <a:t> </a:t>
-            </a:r>
-            <a:r>
-              <a:rPr lang="en-US" sz="3500" dirty="0" err="1">
-                <a:latin typeface="Arial" panose="020B0604020202020204" pitchFamily="34" charset="0"/>
-                <a:cs typeface="Arial" panose="020B0604020202020204" pitchFamily="34" charset="0"/>
-              </a:rPr>
-              <a:t>específicas</a:t>
-            </a:r>
-            <a:r>
-              <a:rPr lang="en-US" sz="3500" dirty="0">
-                <a:latin typeface="Arial" panose="020B0604020202020204" pitchFamily="34" charset="0"/>
-                <a:cs typeface="Arial" panose="020B0604020202020204" pitchFamily="34" charset="0"/>
-              </a:rPr>
-              <a:t>. </a:t>
-            </a:r>
-            <a:r>
-              <a:rPr lang="en-US" sz="3500" dirty="0" err="1">
-                <a:latin typeface="Arial" panose="020B0604020202020204" pitchFamily="34" charset="0"/>
-                <a:cs typeface="Arial" panose="020B0604020202020204" pitchFamily="34" charset="0"/>
-              </a:rPr>
-              <a:t>Revista</a:t>
-            </a:r>
-            <a:r>
-              <a:rPr lang="en-US" sz="3500" dirty="0">
-                <a:latin typeface="Arial" panose="020B0604020202020204" pitchFamily="34" charset="0"/>
-                <a:cs typeface="Arial" panose="020B0604020202020204" pitchFamily="34" charset="0"/>
-              </a:rPr>
-              <a:t> de </a:t>
-            </a:r>
-            <a:r>
-              <a:rPr lang="en-US" sz="3500" dirty="0" err="1">
-                <a:latin typeface="Arial" panose="020B0604020202020204" pitchFamily="34" charset="0"/>
-                <a:cs typeface="Arial" panose="020B0604020202020204" pitchFamily="34" charset="0"/>
-              </a:rPr>
-              <a:t>Inovação</a:t>
-            </a:r>
-            <a:r>
-              <a:rPr lang="en-US" sz="3500" dirty="0">
-                <a:latin typeface="Arial" panose="020B0604020202020204" pitchFamily="34" charset="0"/>
-                <a:cs typeface="Arial" panose="020B0604020202020204" pitchFamily="34" charset="0"/>
-              </a:rPr>
-              <a:t> </a:t>
-            </a:r>
-            <a:r>
-              <a:rPr lang="en-US" sz="3500" dirty="0" err="1">
-                <a:latin typeface="Arial" panose="020B0604020202020204" pitchFamily="34" charset="0"/>
-                <a:cs typeface="Arial" panose="020B0604020202020204" pitchFamily="34" charset="0"/>
-              </a:rPr>
-              <a:t>em</a:t>
-            </a:r>
-            <a:r>
-              <a:rPr lang="en-US" sz="3500" dirty="0">
-                <a:latin typeface="Arial" panose="020B0604020202020204" pitchFamily="34" charset="0"/>
-                <a:cs typeface="Arial" panose="020B0604020202020204" pitchFamily="34" charset="0"/>
-              </a:rPr>
-              <a:t> </a:t>
-            </a:r>
-            <a:r>
-              <a:rPr lang="en-US" sz="3500" dirty="0" err="1">
-                <a:latin typeface="Arial" panose="020B0604020202020204" pitchFamily="34" charset="0"/>
-                <a:cs typeface="Arial" panose="020B0604020202020204" pitchFamily="34" charset="0"/>
-              </a:rPr>
-              <a:t>Saúde</a:t>
-            </a:r>
-            <a:r>
-              <a:rPr lang="en-US" sz="3500" dirty="0">
-                <a:latin typeface="Arial" panose="020B0604020202020204" pitchFamily="34" charset="0"/>
-                <a:cs typeface="Arial" panose="020B0604020202020204" pitchFamily="34" charset="0"/>
-              </a:rPr>
-              <a:t>, v. 6, n. 2, p. 55–66, 2021. </a:t>
+              <a:rPr lang="pt-BR" sz="3500" dirty="0"/>
+              <a:t>BORGES, M. F.; SILVA, L. T. Tecnologias assistivas e inclusão de pessoas com necessidades cognitivas específicas. </a:t>
+            </a:r>
+            <a:r>
+              <a:rPr lang="pt-BR" sz="3500" i="1" dirty="0"/>
+              <a:t>Revista de Inovação em Saúde</a:t>
+            </a:r>
+            <a:r>
+              <a:rPr lang="pt-BR" sz="3500" dirty="0"/>
+              <a:t>, v. 6, n. 2, p. 55–66, 2021.</a:t>
             </a:r>
           </a:p>
           <a:p>
             <a:pPr algn="just"/>
             <a:r>
-              <a:rPr lang="en-US" sz="3500" dirty="0">
-                <a:latin typeface="Arial" panose="020B0604020202020204" pitchFamily="34" charset="0"/>
-                <a:cs typeface="Arial" panose="020B0604020202020204" pitchFamily="34" charset="0"/>
-              </a:rPr>
+              <a:rPr lang="pt-BR" sz="3500" dirty="0"/>
+              <a:t>DEL PRETTE, Z. A. P.; DEL PRETTE, A. H. H. Habilidades sociais e saúde mental: aspectos históricos e conceituais. </a:t>
+            </a:r>
+            <a:r>
+              <a:rPr lang="pt-BR" sz="3500" i="1" dirty="0"/>
+              <a:t>Psicologia: Teoria e Pesquisa</a:t>
+            </a:r>
+            <a:r>
+              <a:rPr lang="pt-BR" sz="3500" dirty="0"/>
+              <a:t>, Brasília, v. 29, n. 3, p. 271–278, 2013.</a:t>
+            </a:r>
+          </a:p>
+          <a:p>
+            <a:pPr algn="just"/>
+            <a:r>
+              <a:rPr lang="pt-BR" sz="3500" dirty="0"/>
               <a:t>OMS – ORGANIZAÇÃO MUNDIAL DA SAÚDE. </a:t>
             </a:r>
             <a:r>
-              <a:rPr lang="en-US" sz="3500" dirty="0" err="1">
-                <a:latin typeface="Arial" panose="020B0604020202020204" pitchFamily="34" charset="0"/>
-                <a:cs typeface="Arial" panose="020B0604020202020204" pitchFamily="34" charset="0"/>
-              </a:rPr>
-              <a:t>Relatório</a:t>
-            </a:r>
-            <a:r>
-              <a:rPr lang="en-US" sz="3500" dirty="0">
-                <a:latin typeface="Arial" panose="020B0604020202020204" pitchFamily="34" charset="0"/>
-                <a:cs typeface="Arial" panose="020B0604020202020204" pitchFamily="34" charset="0"/>
-              </a:rPr>
-              <a:t> </a:t>
-            </a:r>
-            <a:r>
-              <a:rPr lang="en-US" sz="3500" dirty="0" err="1">
-                <a:latin typeface="Arial" panose="020B0604020202020204" pitchFamily="34" charset="0"/>
-                <a:cs typeface="Arial" panose="020B0604020202020204" pitchFamily="34" charset="0"/>
-              </a:rPr>
-              <a:t>mundial</a:t>
-            </a:r>
-            <a:r>
-              <a:rPr lang="en-US" sz="3500" dirty="0">
-                <a:latin typeface="Arial" panose="020B0604020202020204" pitchFamily="34" charset="0"/>
-                <a:cs typeface="Arial" panose="020B0604020202020204" pitchFamily="34" charset="0"/>
-              </a:rPr>
-              <a:t> </a:t>
-            </a:r>
-            <a:r>
-              <a:rPr lang="en-US" sz="3500" dirty="0" err="1">
-                <a:latin typeface="Arial" panose="020B0604020202020204" pitchFamily="34" charset="0"/>
-                <a:cs typeface="Arial" panose="020B0604020202020204" pitchFamily="34" charset="0"/>
-              </a:rPr>
-              <a:t>sobre</a:t>
-            </a:r>
-            <a:r>
-              <a:rPr lang="en-US" sz="3500" dirty="0">
-                <a:latin typeface="Arial" panose="020B0604020202020204" pitchFamily="34" charset="0"/>
-                <a:cs typeface="Arial" panose="020B0604020202020204" pitchFamily="34" charset="0"/>
-              </a:rPr>
-              <a:t> </a:t>
-            </a:r>
-            <a:r>
-              <a:rPr lang="en-US" sz="3500" dirty="0" err="1">
-                <a:latin typeface="Arial" panose="020B0604020202020204" pitchFamily="34" charset="0"/>
-                <a:cs typeface="Arial" panose="020B0604020202020204" pitchFamily="34" charset="0"/>
-              </a:rPr>
-              <a:t>saúde</a:t>
-            </a:r>
-            <a:r>
-              <a:rPr lang="en-US" sz="3500" dirty="0">
-                <a:latin typeface="Arial" panose="020B0604020202020204" pitchFamily="34" charset="0"/>
-                <a:cs typeface="Arial" panose="020B0604020202020204" pitchFamily="34" charset="0"/>
-              </a:rPr>
-              <a:t> mental: </a:t>
-            </a:r>
-            <a:r>
-              <a:rPr lang="en-US" sz="3500" dirty="0" err="1">
-                <a:latin typeface="Arial" panose="020B0604020202020204" pitchFamily="34" charset="0"/>
-                <a:cs typeface="Arial" panose="020B0604020202020204" pitchFamily="34" charset="0"/>
-              </a:rPr>
-              <a:t>transformar</a:t>
-            </a:r>
-            <a:r>
-              <a:rPr lang="en-US" sz="3500" dirty="0">
-                <a:latin typeface="Arial" panose="020B0604020202020204" pitchFamily="34" charset="0"/>
-                <a:cs typeface="Arial" panose="020B0604020202020204" pitchFamily="34" charset="0"/>
-              </a:rPr>
-              <a:t> </a:t>
-            </a:r>
-            <a:r>
-              <a:rPr lang="en-US" sz="3500" dirty="0" err="1">
-                <a:latin typeface="Arial" panose="020B0604020202020204" pitchFamily="34" charset="0"/>
-                <a:cs typeface="Arial" panose="020B0604020202020204" pitchFamily="34" charset="0"/>
-              </a:rPr>
-              <a:t>saúde</a:t>
-            </a:r>
-            <a:r>
-              <a:rPr lang="en-US" sz="3500" dirty="0">
-                <a:latin typeface="Arial" panose="020B0604020202020204" pitchFamily="34" charset="0"/>
-                <a:cs typeface="Arial" panose="020B0604020202020204" pitchFamily="34" charset="0"/>
-              </a:rPr>
-              <a:t> mental para </a:t>
-            </a:r>
-            <a:r>
-              <a:rPr lang="en-US" sz="3500" dirty="0" err="1">
-                <a:latin typeface="Arial" panose="020B0604020202020204" pitchFamily="34" charset="0"/>
-                <a:cs typeface="Arial" panose="020B0604020202020204" pitchFamily="34" charset="0"/>
-              </a:rPr>
-              <a:t>todos</a:t>
-            </a:r>
-            <a:r>
-              <a:rPr lang="en-US" sz="3500" dirty="0">
-                <a:latin typeface="Arial" panose="020B0604020202020204" pitchFamily="34" charset="0"/>
-                <a:cs typeface="Arial" panose="020B0604020202020204" pitchFamily="34" charset="0"/>
-              </a:rPr>
+              <a:rPr lang="pt-BR" sz="3500" i="1" dirty="0"/>
+              <a:t>Relatório mundial sobre saúde mental: transformar saúde mental para todos</a:t>
+            </a:r>
+            <a:r>
+              <a:rPr lang="pt-BR" sz="3500" dirty="0"/>
               <a:t>. Genebra: OMS, 2022.</a:t>
-            </a:r>
-          </a:p>
-          <a:p>
-            <a:pPr algn="just"/>
-            <a:r>
-              <a:rPr lang="en-US" sz="3500" dirty="0">
-                <a:latin typeface="Arial" panose="020B0604020202020204" pitchFamily="34" charset="0"/>
-                <a:cs typeface="Arial" panose="020B0604020202020204" pitchFamily="34" charset="0"/>
-              </a:rPr>
-              <a:t>DEL PRETTE, Z. A. P.; DEL PRETTE, A. H. H. </a:t>
-            </a:r>
-            <a:r>
-              <a:rPr lang="en-US" sz="3500" dirty="0" err="1">
-                <a:latin typeface="Arial" panose="020B0604020202020204" pitchFamily="34" charset="0"/>
-                <a:cs typeface="Arial" panose="020B0604020202020204" pitchFamily="34" charset="0"/>
-              </a:rPr>
-              <a:t>Habilidades</a:t>
-            </a:r>
-            <a:r>
-              <a:rPr lang="en-US" sz="3500" dirty="0">
-                <a:latin typeface="Arial" panose="020B0604020202020204" pitchFamily="34" charset="0"/>
-                <a:cs typeface="Arial" panose="020B0604020202020204" pitchFamily="34" charset="0"/>
-              </a:rPr>
-              <a:t> </a:t>
-            </a:r>
-            <a:r>
-              <a:rPr lang="en-US" sz="3500" dirty="0" err="1">
-                <a:latin typeface="Arial" panose="020B0604020202020204" pitchFamily="34" charset="0"/>
-                <a:cs typeface="Arial" panose="020B0604020202020204" pitchFamily="34" charset="0"/>
-              </a:rPr>
-              <a:t>sociais</a:t>
-            </a:r>
-            <a:r>
-              <a:rPr lang="en-US" sz="3500" dirty="0">
-                <a:latin typeface="Arial" panose="020B0604020202020204" pitchFamily="34" charset="0"/>
-                <a:cs typeface="Arial" panose="020B0604020202020204" pitchFamily="34" charset="0"/>
-              </a:rPr>
-              <a:t> e </a:t>
-            </a:r>
-            <a:r>
-              <a:rPr lang="en-US" sz="3500" dirty="0" err="1">
-                <a:latin typeface="Arial" panose="020B0604020202020204" pitchFamily="34" charset="0"/>
-                <a:cs typeface="Arial" panose="020B0604020202020204" pitchFamily="34" charset="0"/>
-              </a:rPr>
-              <a:t>saúde</a:t>
-            </a:r>
-            <a:r>
-              <a:rPr lang="en-US" sz="3500" dirty="0">
-                <a:latin typeface="Arial" panose="020B0604020202020204" pitchFamily="34" charset="0"/>
-                <a:cs typeface="Arial" panose="020B0604020202020204" pitchFamily="34" charset="0"/>
-              </a:rPr>
-              <a:t> mental: </a:t>
-            </a:r>
-            <a:r>
-              <a:rPr lang="en-US" sz="3500" dirty="0" err="1">
-                <a:latin typeface="Arial" panose="020B0604020202020204" pitchFamily="34" charset="0"/>
-                <a:cs typeface="Arial" panose="020B0604020202020204" pitchFamily="34" charset="0"/>
-              </a:rPr>
-              <a:t>aspectos</a:t>
-            </a:r>
-            <a:r>
-              <a:rPr lang="en-US" sz="3500" dirty="0">
-                <a:latin typeface="Arial" panose="020B0604020202020204" pitchFamily="34" charset="0"/>
-                <a:cs typeface="Arial" panose="020B0604020202020204" pitchFamily="34" charset="0"/>
-              </a:rPr>
-              <a:t> </a:t>
-            </a:r>
-            <a:r>
-              <a:rPr lang="en-US" sz="3500" dirty="0" err="1">
-                <a:latin typeface="Arial" panose="020B0604020202020204" pitchFamily="34" charset="0"/>
-                <a:cs typeface="Arial" panose="020B0604020202020204" pitchFamily="34" charset="0"/>
-              </a:rPr>
-              <a:t>históricos</a:t>
-            </a:r>
-            <a:r>
-              <a:rPr lang="en-US" sz="3500" dirty="0">
-                <a:latin typeface="Arial" panose="020B0604020202020204" pitchFamily="34" charset="0"/>
-                <a:cs typeface="Arial" panose="020B0604020202020204" pitchFamily="34" charset="0"/>
-              </a:rPr>
-              <a:t> e </a:t>
-            </a:r>
-            <a:r>
-              <a:rPr lang="en-US" sz="3500" dirty="0" err="1">
-                <a:latin typeface="Arial" panose="020B0604020202020204" pitchFamily="34" charset="0"/>
-                <a:cs typeface="Arial" panose="020B0604020202020204" pitchFamily="34" charset="0"/>
-              </a:rPr>
-              <a:t>conceituais</a:t>
-            </a:r>
-            <a:r>
-              <a:rPr lang="en-US" sz="3500" dirty="0">
-                <a:latin typeface="Arial" panose="020B0604020202020204" pitchFamily="34" charset="0"/>
-                <a:cs typeface="Arial" panose="020B0604020202020204" pitchFamily="34" charset="0"/>
-              </a:rPr>
-              <a:t>. </a:t>
-            </a:r>
-            <a:r>
-              <a:rPr lang="en-US" sz="3500" dirty="0" err="1">
-                <a:latin typeface="Arial" panose="020B0604020202020204" pitchFamily="34" charset="0"/>
-                <a:cs typeface="Arial" panose="020B0604020202020204" pitchFamily="34" charset="0"/>
-              </a:rPr>
-              <a:t>Psicologia</a:t>
-            </a:r>
-            <a:r>
-              <a:rPr lang="en-US" sz="3500" dirty="0">
-                <a:latin typeface="Arial" panose="020B0604020202020204" pitchFamily="34" charset="0"/>
-                <a:cs typeface="Arial" panose="020B0604020202020204" pitchFamily="34" charset="0"/>
-              </a:rPr>
-              <a:t>: Teoria e Pesquisa, Brasília, v. 29, n. 3, p. 271–278, 2013.</a:t>
             </a:r>
           </a:p>
         </p:txBody>
@@ -4487,36 +4186,6 @@
           </a:p>
         </p:txBody>
       </p:sp>
-      <p:pic>
-        <p:nvPicPr>
-          <p:cNvPr id="10" name="Imagem 9">
-            <a:extLst>
-              <a:ext uri="{FF2B5EF4-FFF2-40B4-BE49-F238E27FC236}">
-                <a16:creationId xmlns:a16="http://schemas.microsoft.com/office/drawing/2014/main" id="{0013E4E3-E672-2F05-547E-5F6CCA2C5E49}"/>
-              </a:ext>
-            </a:extLst>
-          </p:cNvPr>
-          <p:cNvPicPr>
-            <a:picLocks noChangeAspect="1"/>
-          </p:cNvPicPr>
-          <p:nvPr/>
-        </p:nvPicPr>
-        <p:blipFill>
-          <a:blip r:embed="rId7"/>
-          <a:stretch>
-            <a:fillRect/>
-          </a:stretch>
-        </p:blipFill>
-        <p:spPr>
-          <a:xfrm>
-            <a:off x="1166503" y="31501614"/>
-            <a:ext cx="14441770" cy="1477541"/>
-          </a:xfrm>
-          <a:prstGeom prst="rect">
-            <a:avLst/>
-          </a:prstGeom>
-        </p:spPr>
-      </p:pic>
       <p:sp>
         <p:nvSpPr>
           <p:cNvPr id="11" name="CaixaDeTexto 10">
@@ -4531,8 +4200,8 @@
         </p:nvSpPr>
         <p:spPr>
           <a:xfrm>
-            <a:off x="6246961" y="32924309"/>
-            <a:ext cx="2365263" cy="323165"/>
+            <a:off x="6611401" y="34911592"/>
+            <a:ext cx="2915093" cy="323165"/>
           </a:xfrm>
           <a:prstGeom prst="rect">
             <a:avLst/>
@@ -4559,7 +4228,7 @@
           <a:p>
             <a:r>
               <a:rPr lang="pt-BR" sz="1500" dirty="0"/>
-              <a:t>Fonte: Elaborado pelo autor</a:t>
+              <a:t>Fonte: Elaborado pelo autor (2025)</a:t>
             </a:r>
           </a:p>
         </p:txBody>
@@ -4579,14 +4248,14 @@
           <p:nvPr/>
         </p:nvPicPr>
         <p:blipFill>
-          <a:blip r:embed="rId8"/>
+          <a:blip r:embed="rId7"/>
           <a:stretch>
             <a:fillRect/>
           </a:stretch>
         </p:blipFill>
         <p:spPr>
           <a:xfrm>
-            <a:off x="18817769" y="14403981"/>
+            <a:off x="18646139" y="14473332"/>
             <a:ext cx="8584076" cy="3090268"/>
           </a:xfrm>
           <a:prstGeom prst="rect">
@@ -4608,7 +4277,7 @@
         </p:nvSpPr>
         <p:spPr>
           <a:xfrm>
-            <a:off x="21823237" y="17320347"/>
+            <a:off x="22188550" y="17503151"/>
             <a:ext cx="2573140" cy="323165"/>
           </a:xfrm>
           <a:prstGeom prst="rect">
@@ -4658,7 +4327,7 @@
         </p:nvSpPr>
         <p:spPr>
           <a:xfrm>
-            <a:off x="19923552" y="14235212"/>
+            <a:off x="20143530" y="14057895"/>
             <a:ext cx="5187639" cy="323165"/>
           </a:xfrm>
           <a:prstGeom prst="rect">
@@ -4689,7 +4358,7 @@
                 <a:latin typeface="Arial" panose="020B0604020202020204" pitchFamily="34" charset="0"/>
                 <a:cs typeface="Arial" panose="020B0604020202020204" pitchFamily="34" charset="0"/>
               </a:rPr>
-              <a:t>Figura  2 – Probabilidade de usar/recomendar o aplicativo </a:t>
+              <a:t>Figura  2:  Probabilidade de usar/recomendar o aplicativo </a:t>
             </a:r>
           </a:p>
         </p:txBody>
@@ -4709,14 +4378,14 @@
           <p:nvPr/>
         </p:nvPicPr>
         <p:blipFill>
-          <a:blip r:embed="rId9"/>
+          <a:blip r:embed="rId8"/>
           <a:stretch>
             <a:fillRect/>
           </a:stretch>
         </p:blipFill>
         <p:spPr>
           <a:xfrm>
-            <a:off x="17690718" y="23530537"/>
+            <a:off x="17897851" y="22688663"/>
             <a:ext cx="12755127" cy="4624824"/>
           </a:xfrm>
           <a:prstGeom prst="rect">
@@ -4738,7 +4407,7 @@
         </p:nvSpPr>
         <p:spPr>
           <a:xfrm>
-            <a:off x="22538051" y="28185886"/>
+            <a:off x="22563364" y="27450528"/>
             <a:ext cx="2573140" cy="323165"/>
           </a:xfrm>
           <a:prstGeom prst="rect">
@@ -4789,15 +4458,15 @@
           <p:nvPr/>
         </p:nvPicPr>
         <p:blipFill>
-          <a:blip r:embed="rId10"/>
+          <a:blip r:embed="rId9"/>
           <a:stretch>
             <a:fillRect/>
           </a:stretch>
         </p:blipFill>
         <p:spPr>
           <a:xfrm>
-            <a:off x="6212487" y="16881928"/>
-            <a:ext cx="3262160" cy="3255335"/>
+            <a:off x="4605205" y="16018466"/>
+            <a:ext cx="7170043" cy="7155041"/>
           </a:xfrm>
           <a:prstGeom prst="rect">
             <a:avLst/>
@@ -4818,8 +4487,8 @@
         </p:nvSpPr>
         <p:spPr>
           <a:xfrm>
-            <a:off x="6564573" y="16881928"/>
-            <a:ext cx="2444900" cy="323165"/>
+            <a:off x="6411628" y="16117509"/>
+            <a:ext cx="2390398" cy="323165"/>
           </a:xfrm>
           <a:prstGeom prst="rect">
             <a:avLst/>
@@ -4849,7 +4518,7 @@
                 <a:latin typeface="Arial" panose="020B0604020202020204" pitchFamily="34" charset="0"/>
                 <a:cs typeface="Arial" panose="020B0604020202020204" pitchFamily="34" charset="0"/>
               </a:rPr>
-              <a:t>Figura 1 – Logo do projeto</a:t>
+              <a:t>Figura 1:  Logo do projeto</a:t>
             </a:r>
           </a:p>
         </p:txBody>
@@ -4868,8 +4537,8 @@
         </p:nvSpPr>
         <p:spPr>
           <a:xfrm>
-            <a:off x="6581321" y="19652517"/>
-            <a:ext cx="2573140" cy="323165"/>
+            <a:off x="6411628" y="22935242"/>
+            <a:ext cx="3183885" cy="323165"/>
           </a:xfrm>
           <a:prstGeom prst="rect">
             <a:avLst/>
@@ -4899,7 +4568,7 @@
                 <a:latin typeface="Arial" panose="020B0604020202020204" pitchFamily="34" charset="0"/>
                 <a:cs typeface="Arial" panose="020B0604020202020204" pitchFamily="34" charset="0"/>
               </a:rPr>
-              <a:t>Fonte: Elaborado pelo autor</a:t>
+              <a:t>Fonte: Elaborado pelo autor (2025)</a:t>
             </a:r>
           </a:p>
         </p:txBody>
@@ -4918,8 +4587,8 @@
         </p:nvSpPr>
         <p:spPr>
           <a:xfrm>
-            <a:off x="6246961" y="31258591"/>
-            <a:ext cx="2113079" cy="323165"/>
+            <a:off x="7165746" y="32880219"/>
+            <a:ext cx="2048959" cy="323165"/>
           </a:xfrm>
           <a:prstGeom prst="rect">
             <a:avLst/>
@@ -4949,7 +4618,7 @@
                 <a:latin typeface="Arial" panose="020B0604020202020204" pitchFamily="34" charset="0"/>
                 <a:cs typeface="Arial" panose="020B0604020202020204" pitchFamily="34" charset="0"/>
               </a:rPr>
-              <a:t>Figura 2 - Metodologia</a:t>
+              <a:t>Figura 2: Metodologia</a:t>
             </a:r>
           </a:p>
         </p:txBody>
@@ -4968,8 +4637,8 @@
         </p:nvSpPr>
         <p:spPr>
           <a:xfrm>
-            <a:off x="16569909" y="11010802"/>
-            <a:ext cx="15283148" cy="3323987"/>
+            <a:off x="16373057" y="11072681"/>
+            <a:ext cx="15283148" cy="2785378"/>
           </a:xfrm>
           <a:prstGeom prst="rect">
             <a:avLst/>
@@ -4996,11 +4665,8 @@
           <a:p>
             <a:pPr algn="just"/>
             <a:r>
-              <a:rPr lang="pt-BR" sz="3500" dirty="0">
-                <a:latin typeface="Arial" panose="020B0604020202020204" pitchFamily="34" charset="0"/>
-                <a:cs typeface="Arial" panose="020B0604020202020204" pitchFamily="34" charset="0"/>
-              </a:rPr>
-              <a:t>Os resultados mostram uma demanda crescente por tecnologias inclusivas que atendam às necessidades de pessoas neurodivergentes, destacando a importância de autonomia, acessibilidade e personalização da experiência do usuário. Ferramentas digitais adaptadas podem ampliar a participação social e favorecer o desenvolvimento de habilidades de autorregulação emocional.</a:t>
+              <a:rPr lang="pt-BR" sz="3500" dirty="0"/>
+              <a:t>Os resultados mostram uma demanda crescente por tecnologias inclusivas que atendam às necessidades de pessoas neurodivergentes, destacando a importância da autonomia, da acessibilidade e da personalização da experiência do usuário. Ferramentas digitais adaptadas podem ampliar a participação social e favorecer o desenvolvimento de habilidades de autorregulação emocional.</a:t>
             </a:r>
           </a:p>
         </p:txBody>
@@ -5019,8 +4685,8 @@
         </p:nvSpPr>
         <p:spPr>
           <a:xfrm>
-            <a:off x="22880804" y="23148071"/>
-            <a:ext cx="1887633" cy="323165"/>
+            <a:off x="22938177" y="22241487"/>
+            <a:ext cx="1823513" cy="323165"/>
           </a:xfrm>
           <a:prstGeom prst="rect">
             <a:avLst/>
@@ -5050,7 +4716,91 @@
                 <a:latin typeface="Arial" panose="020B0604020202020204" pitchFamily="34" charset="0"/>
                 <a:cs typeface="Arial" panose="020B0604020202020204" pitchFamily="34" charset="0"/>
               </a:rPr>
-              <a:t>Figura 4 - Aplicação</a:t>
+              <a:t>Figura 4: Aplicação</a:t>
+            </a:r>
+          </a:p>
+        </p:txBody>
+      </p:sp>
+      <p:pic>
+        <p:nvPicPr>
+          <p:cNvPr id="5" name="Imagem 4">
+            <a:extLst>
+              <a:ext uri="{FF2B5EF4-FFF2-40B4-BE49-F238E27FC236}">
+                <a16:creationId xmlns:a16="http://schemas.microsoft.com/office/drawing/2014/main" id="{89D6D845-E855-F362-FB7C-C476E2666448}"/>
+              </a:ext>
+            </a:extLst>
+          </p:cNvPr>
+          <p:cNvPicPr>
+            <a:picLocks noChangeAspect="1"/>
+          </p:cNvPicPr>
+          <p:nvPr/>
+        </p:nvPicPr>
+        <p:blipFill>
+          <a:blip r:embed="rId10">
+            <a:extLst>
+              <a:ext uri="{28A0092B-C50C-407E-A947-70E740481C1C}">
+                <a14:useLocalDpi xmlns:a14="http://schemas.microsoft.com/office/drawing/2010/main" val="0"/>
+              </a:ext>
+            </a:extLst>
+          </a:blip>
+          <a:stretch>
+            <a:fillRect/>
+          </a:stretch>
+        </p:blipFill>
+        <p:spPr>
+          <a:xfrm>
+            <a:off x="374954" y="33203384"/>
+            <a:ext cx="15836421" cy="1666991"/>
+          </a:xfrm>
+          <a:prstGeom prst="rect">
+            <a:avLst/>
+          </a:prstGeom>
+        </p:spPr>
+      </p:pic>
+      <p:sp>
+        <p:nvSpPr>
+          <p:cNvPr id="42" name="CaixaDeTexto 41">
+            <a:extLst>
+              <a:ext uri="{FF2B5EF4-FFF2-40B4-BE49-F238E27FC236}">
+                <a16:creationId xmlns:a16="http://schemas.microsoft.com/office/drawing/2014/main" id="{7BBD8D5C-87E6-6B70-5CD3-DD3F5FD76A65}"/>
+              </a:ext>
+            </a:extLst>
+          </p:cNvPr>
+          <p:cNvSpPr txBox="1"/>
+          <p:nvPr/>
+        </p:nvSpPr>
+        <p:spPr>
+          <a:xfrm>
+            <a:off x="548034" y="24411373"/>
+            <a:ext cx="15578758" cy="4401205"/>
+          </a:xfrm>
+          <a:prstGeom prst="rect">
+            <a:avLst/>
+          </a:prstGeom>
+          <a:noFill/>
+          <a:effectLst>
+            <a:glow rad="127000">
+              <a:schemeClr val="bg1">
+                <a:alpha val="0"/>
+              </a:schemeClr>
+            </a:glow>
+            <a:outerShdw blurRad="50800" dist="50800" dir="5400000" algn="ctr" rotWithShape="0">
+              <a:srgbClr val="000000">
+                <a:alpha val="0"/>
+              </a:srgbClr>
+            </a:outerShdw>
+          </a:effectLst>
+        </p:spPr>
+        <p:txBody>
+          <a:bodyPr wrap="square" rtlCol="0">
+            <a:spAutoFit/>
+          </a:bodyPr>
+          <a:lstStyle/>
+          <a:p>
+            <a:pPr algn="just"/>
+            <a:r>
+              <a:rPr lang="pt-BR" sz="3500" dirty="0"/>
+              <a:t>O objetivo do Projeto Polaris é auxiliar no cuidado e no acompanhamento da saúde mental por meio de um aplicativo simples, intuitivo e acessível. A proposta é oferecer uma ferramenta que ajude o usuário a registrar e monitorar o próprio humor, sintomas e hábitos diários, possibilitando a identificação de padrões e uma compreensão mais profunda sobre seu bem-estar emocional. Além de incentivar o autoconhecimento, o aplicativo busca fortalecer o vínculo entre paciente e profissional de saúde, permitindo o compartilhamento de dados que podem contribuir para um acompanhamento mais preciso e personalizado.</a:t>
             </a:r>
           </a:p>
         </p:txBody>
@@ -5537,5 +5287,19 @@
 </file>
 
 <file path=customXml/itemProps3.xml><?xml version="1.0" encoding="utf-8"?>
-<ds:datastoreItem xmlns:ds="http://schemas.openxmlformats.org/officeDocument/2006/customXml" ds:itemID="{DB50B15B-6B6C-413D-85DF-3989BC73587A}"/>
+<ds:datastoreItem xmlns:ds="http://schemas.openxmlformats.org/officeDocument/2006/customXml" ds:itemID="{DB50B15B-6B6C-413D-85DF-3989BC73587A}">
+  <ds:schemaRefs>
+    <ds:schemaRef ds:uri="http://schemas.microsoft.com/office/2006/metadata/contentType"/>
+    <ds:schemaRef ds:uri="http://schemas.microsoft.com/office/2006/metadata/properties/metaAttributes"/>
+    <ds:schemaRef ds:uri="http://www.w3.org/2001/XMLSchema"/>
+    <ds:schemaRef ds:uri="http://schemas.microsoft.com/office/2006/metadata/properties"/>
+    <ds:schemaRef ds:uri="6e747b62-d86a-4d2b-a9b9-29bada85a464"/>
+    <ds:schemaRef ds:uri="http://schemas.microsoft.com/office/2006/documentManagement/types"/>
+    <ds:schemaRef ds:uri="http://schemas.microsoft.com/office/infopath/2007/PartnerControls"/>
+    <ds:schemaRef ds:uri="http://schemas.openxmlformats.org/package/2006/metadata/core-properties"/>
+    <ds:schemaRef ds:uri="http://purl.org/dc/elements/1.1/"/>
+    <ds:schemaRef ds:uri="http://purl.org/dc/terms/"/>
+    <ds:schemaRef ds:uri="http://schemas.microsoft.com/internal/obd"/>
+  </ds:schemaRefs>
+</ds:datastoreItem>
 </file>
</xml_diff>